<commit_message>
Adding infographic to .pdf
</commit_message>
<xml_diff>
--- a/docs/no_lo_abras.pptx
+++ b/docs/no_lo_abras.pptx
@@ -223,7 +223,7 @@
           <a:p>
             <a:fld id="{CA8D38B1-D440-436D-BDFE-4485B1CA3ED5}" type="datetimeFigureOut">
               <a:rPr lang="es-ES" smtClean="0"/>
-              <a:t>26/10/2024</a:t>
+              <a:t>26/03/2025</a:t>
             </a:fld>
             <a:endParaRPr lang="es-ES" dirty="0"/>
           </a:p>
@@ -301,7 +301,7 @@
           <a:p>
             <a:fld id="{8284D498-BDE3-49E4-A686-9D81DE47FF4B}" type="slidenum">
               <a:rPr lang="es-ES" smtClean="0"/>
-              <a:t>‹#›</a:t>
+              <a:t>‹Nº›</a:t>
             </a:fld>
             <a:endParaRPr lang="es-ES" dirty="0"/>
           </a:p>
@@ -401,7 +401,7 @@
           <a:p>
             <a:fld id="{8EC804D9-0FE5-4B88-840A-6591E59A40EE}" type="datetimeFigureOut">
               <a:rPr lang="es-ES" smtClean="0"/>
-              <a:t>26/10/2024</a:t>
+              <a:t>26/03/2025</a:t>
             </a:fld>
             <a:endParaRPr lang="es-ES" dirty="0"/>
           </a:p>
@@ -560,7 +560,7 @@
           <a:p>
             <a:fld id="{5C1227C4-6C9C-4D24-9CC8-8E7C066462A0}" type="slidenum">
               <a:rPr lang="es-ES" smtClean="0"/>
-              <a:t>‹#›</a:t>
+              <a:t>‹Nº›</a:t>
             </a:fld>
             <a:endParaRPr lang="es-ES" dirty="0"/>
           </a:p>
@@ -801,7 +801,7 @@
           <a:p>
             <a:fld id="{F2718F7B-7F5C-4B9B-9CA2-D4147B9A0DF7}" type="datetime1">
               <a:rPr lang="en-US" smtClean="0"/>
-              <a:t>10/26/2024</a:t>
+              <a:t>3/26/2025</a:t>
             </a:fld>
             <a:endParaRPr lang="en-US" dirty="0"/>
           </a:p>
@@ -846,12 +846,48 @@
           <a:p>
             <a:fld id="{65E34CCE-5110-4F9D-AD9C-A0100FD925AA}" type="slidenum">
               <a:rPr lang="en-US" smtClean="0"/>
-              <a:t>‹#›</a:t>
+              <a:t>‹Nº›</a:t>
             </a:fld>
             <a:endParaRPr lang="en-US" dirty="0"/>
           </a:p>
         </p:txBody>
       </p:sp>
+      <p:pic>
+        <p:nvPicPr>
+          <p:cNvPr id="7" name="Graphic 4">
+            <a:extLst>
+              <a:ext uri="{FF2B5EF4-FFF2-40B4-BE49-F238E27FC236}">
+                <a16:creationId xmlns:a16="http://schemas.microsoft.com/office/drawing/2014/main" id="{6B81243D-3932-A75F-F857-20958D9DBD0A}"/>
+              </a:ext>
+            </a:extLst>
+          </p:cNvPr>
+          <p:cNvPicPr>
+            <a:picLocks noChangeAspect="1"/>
+          </p:cNvPicPr>
+          <p:nvPr userDrawn="1"/>
+        </p:nvPicPr>
+        <p:blipFill>
+          <a:blip r:embed="rId2">
+            <a:extLst>
+              <a:ext uri="{96DAC541-7B7A-43D3-8B79-37D633B846F1}">
+                <asvg:svgBlip xmlns:asvg="http://schemas.microsoft.com/office/drawing/2016/SVG/main" r:embed="rId3"/>
+              </a:ext>
+            </a:extLst>
+          </a:blip>
+          <a:stretch>
+            <a:fillRect/>
+          </a:stretch>
+        </p:blipFill>
+        <p:spPr>
+          <a:xfrm>
+            <a:off x="5458357" y="5458357"/>
+            <a:ext cx="1399643" cy="1399643"/>
+          </a:xfrm>
+          <a:prstGeom prst="rect">
+            <a:avLst/>
+          </a:prstGeom>
+        </p:spPr>
+      </p:pic>
     </p:spTree>
     <p:extLst>
       <p:ext uri="{BB962C8B-B14F-4D97-AF65-F5344CB8AC3E}">
@@ -974,7 +1010,7 @@
           <a:p>
             <a:fld id="{CBA3BC20-4351-41FC-B6F0-2B35247FC072}" type="datetime1">
               <a:rPr lang="en-US" smtClean="0"/>
-              <a:t>10/26/2024</a:t>
+              <a:t>3/26/2025</a:t>
             </a:fld>
             <a:endParaRPr lang="en-US" dirty="0"/>
           </a:p>
@@ -1019,12 +1055,48 @@
           <a:p>
             <a:fld id="{65E34CCE-5110-4F9D-AD9C-A0100FD925AA}" type="slidenum">
               <a:rPr lang="en-US" smtClean="0"/>
-              <a:t>‹#›</a:t>
+              <a:t>‹Nº›</a:t>
             </a:fld>
             <a:endParaRPr lang="en-US" dirty="0"/>
           </a:p>
         </p:txBody>
       </p:sp>
+      <p:pic>
+        <p:nvPicPr>
+          <p:cNvPr id="7" name="Graphic 4">
+            <a:extLst>
+              <a:ext uri="{FF2B5EF4-FFF2-40B4-BE49-F238E27FC236}">
+                <a16:creationId xmlns:a16="http://schemas.microsoft.com/office/drawing/2014/main" id="{769406A2-39BD-A9C0-53E6-56A091D27DF8}"/>
+              </a:ext>
+            </a:extLst>
+          </p:cNvPr>
+          <p:cNvPicPr>
+            <a:picLocks noChangeAspect="1"/>
+          </p:cNvPicPr>
+          <p:nvPr userDrawn="1"/>
+        </p:nvPicPr>
+        <p:blipFill>
+          <a:blip r:embed="rId2">
+            <a:extLst>
+              <a:ext uri="{96DAC541-7B7A-43D3-8B79-37D633B846F1}">
+                <asvg:svgBlip xmlns:asvg="http://schemas.microsoft.com/office/drawing/2016/SVG/main" r:embed="rId3"/>
+              </a:ext>
+            </a:extLst>
+          </a:blip>
+          <a:stretch>
+            <a:fillRect/>
+          </a:stretch>
+        </p:blipFill>
+        <p:spPr>
+          <a:xfrm>
+            <a:off x="5458357" y="5458357"/>
+            <a:ext cx="1399643" cy="1399643"/>
+          </a:xfrm>
+          <a:prstGeom prst="rect">
+            <a:avLst/>
+          </a:prstGeom>
+        </p:spPr>
+      </p:pic>
     </p:spTree>
     <p:extLst>
       <p:ext uri="{BB962C8B-B14F-4D97-AF65-F5344CB8AC3E}">
@@ -1157,7 +1229,7 @@
           <a:p>
             <a:fld id="{69835CC4-2D6D-4C1A-BA0C-1E028A0FC163}" type="datetime1">
               <a:rPr lang="en-US" smtClean="0"/>
-              <a:t>10/26/2024</a:t>
+              <a:t>3/26/2025</a:t>
             </a:fld>
             <a:endParaRPr lang="en-US" dirty="0"/>
           </a:p>
@@ -1202,12 +1274,48 @@
           <a:p>
             <a:fld id="{65E34CCE-5110-4F9D-AD9C-A0100FD925AA}" type="slidenum">
               <a:rPr lang="en-US" smtClean="0"/>
-              <a:t>‹#›</a:t>
+              <a:t>‹Nº›</a:t>
             </a:fld>
             <a:endParaRPr lang="en-US" dirty="0"/>
           </a:p>
         </p:txBody>
       </p:sp>
+      <p:pic>
+        <p:nvPicPr>
+          <p:cNvPr id="7" name="Graphic 4">
+            <a:extLst>
+              <a:ext uri="{FF2B5EF4-FFF2-40B4-BE49-F238E27FC236}">
+                <a16:creationId xmlns:a16="http://schemas.microsoft.com/office/drawing/2014/main" id="{73776436-D1EE-9297-7E09-8EDFF9B14983}"/>
+              </a:ext>
+            </a:extLst>
+          </p:cNvPr>
+          <p:cNvPicPr>
+            <a:picLocks noChangeAspect="1"/>
+          </p:cNvPicPr>
+          <p:nvPr userDrawn="1"/>
+        </p:nvPicPr>
+        <p:blipFill>
+          <a:blip r:embed="rId2">
+            <a:extLst>
+              <a:ext uri="{96DAC541-7B7A-43D3-8B79-37D633B846F1}">
+                <asvg:svgBlip xmlns:asvg="http://schemas.microsoft.com/office/drawing/2016/SVG/main" r:embed="rId3"/>
+              </a:ext>
+            </a:extLst>
+          </a:blip>
+          <a:stretch>
+            <a:fillRect/>
+          </a:stretch>
+        </p:blipFill>
+        <p:spPr>
+          <a:xfrm>
+            <a:off x="5458357" y="5458357"/>
+            <a:ext cx="1399643" cy="1399643"/>
+          </a:xfrm>
+          <a:prstGeom prst="rect">
+            <a:avLst/>
+          </a:prstGeom>
+        </p:spPr>
+      </p:pic>
     </p:spTree>
     <p:extLst>
       <p:ext uri="{BB962C8B-B14F-4D97-AF65-F5344CB8AC3E}">
@@ -1330,7 +1438,7 @@
           <a:p>
             <a:fld id="{7AB3F6D7-A9CD-4AA2-841F-EB1B4AC1D973}" type="datetime1">
               <a:rPr lang="en-US" smtClean="0"/>
-              <a:t>10/26/2024</a:t>
+              <a:t>3/26/2025</a:t>
             </a:fld>
             <a:endParaRPr lang="en-US" dirty="0"/>
           </a:p>
@@ -1375,12 +1483,48 @@
           <a:p>
             <a:fld id="{65E34CCE-5110-4F9D-AD9C-A0100FD925AA}" type="slidenum">
               <a:rPr lang="en-US" smtClean="0"/>
-              <a:t>‹#›</a:t>
+              <a:t>‹Nº›</a:t>
             </a:fld>
             <a:endParaRPr lang="en-US" dirty="0"/>
           </a:p>
         </p:txBody>
       </p:sp>
+      <p:pic>
+        <p:nvPicPr>
+          <p:cNvPr id="7" name="Graphic 4">
+            <a:extLst>
+              <a:ext uri="{FF2B5EF4-FFF2-40B4-BE49-F238E27FC236}">
+                <a16:creationId xmlns:a16="http://schemas.microsoft.com/office/drawing/2014/main" id="{2B473002-250E-87A3-9B68-5AB555863EB8}"/>
+              </a:ext>
+            </a:extLst>
+          </p:cNvPr>
+          <p:cNvPicPr>
+            <a:picLocks noChangeAspect="1"/>
+          </p:cNvPicPr>
+          <p:nvPr userDrawn="1"/>
+        </p:nvPicPr>
+        <p:blipFill>
+          <a:blip r:embed="rId2">
+            <a:extLst>
+              <a:ext uri="{96DAC541-7B7A-43D3-8B79-37D633B846F1}">
+                <asvg:svgBlip xmlns:asvg="http://schemas.microsoft.com/office/drawing/2016/SVG/main" r:embed="rId3"/>
+              </a:ext>
+            </a:extLst>
+          </a:blip>
+          <a:stretch>
+            <a:fillRect/>
+          </a:stretch>
+        </p:blipFill>
+        <p:spPr>
+          <a:xfrm>
+            <a:off x="5458357" y="5458357"/>
+            <a:ext cx="1399643" cy="1399643"/>
+          </a:xfrm>
+          <a:prstGeom prst="rect">
+            <a:avLst/>
+          </a:prstGeom>
+        </p:spPr>
+      </p:pic>
     </p:spTree>
     <p:extLst>
       <p:ext uri="{BB962C8B-B14F-4D97-AF65-F5344CB8AC3E}">
@@ -1579,7 +1723,7 @@
           <a:p>
             <a:fld id="{3153CA64-C62E-4F85-8320-C5461359A627}" type="datetime1">
               <a:rPr lang="en-US" smtClean="0"/>
-              <a:t>10/26/2024</a:t>
+              <a:t>3/26/2025</a:t>
             </a:fld>
             <a:endParaRPr lang="en-US" dirty="0"/>
           </a:p>
@@ -1624,12 +1768,48 @@
           <a:p>
             <a:fld id="{65E34CCE-5110-4F9D-AD9C-A0100FD925AA}" type="slidenum">
               <a:rPr lang="en-US" smtClean="0"/>
-              <a:t>‹#›</a:t>
+              <a:t>‹Nº›</a:t>
             </a:fld>
             <a:endParaRPr lang="en-US" dirty="0"/>
           </a:p>
         </p:txBody>
       </p:sp>
+      <p:pic>
+        <p:nvPicPr>
+          <p:cNvPr id="7" name="Graphic 4">
+            <a:extLst>
+              <a:ext uri="{FF2B5EF4-FFF2-40B4-BE49-F238E27FC236}">
+                <a16:creationId xmlns:a16="http://schemas.microsoft.com/office/drawing/2014/main" id="{AD756B3C-3237-5B88-76C7-9868D786FAB8}"/>
+              </a:ext>
+            </a:extLst>
+          </p:cNvPr>
+          <p:cNvPicPr>
+            <a:picLocks noChangeAspect="1"/>
+          </p:cNvPicPr>
+          <p:nvPr userDrawn="1"/>
+        </p:nvPicPr>
+        <p:blipFill>
+          <a:blip r:embed="rId2">
+            <a:extLst>
+              <a:ext uri="{96DAC541-7B7A-43D3-8B79-37D633B846F1}">
+                <asvg:svgBlip xmlns:asvg="http://schemas.microsoft.com/office/drawing/2016/SVG/main" r:embed="rId3"/>
+              </a:ext>
+            </a:extLst>
+          </a:blip>
+          <a:stretch>
+            <a:fillRect/>
+          </a:stretch>
+        </p:blipFill>
+        <p:spPr>
+          <a:xfrm>
+            <a:off x="5458357" y="5458357"/>
+            <a:ext cx="1399643" cy="1399643"/>
+          </a:xfrm>
+          <a:prstGeom prst="rect">
+            <a:avLst/>
+          </a:prstGeom>
+        </p:spPr>
+      </p:pic>
     </p:spTree>
     <p:extLst>
       <p:ext uri="{BB962C8B-B14F-4D97-AF65-F5344CB8AC3E}">
@@ -1814,7 +1994,7 @@
           <a:p>
             <a:fld id="{214826C6-DDAC-4FC0-A019-39E13DE9F9E8}" type="datetime1">
               <a:rPr lang="en-US" smtClean="0"/>
-              <a:t>10/26/2024</a:t>
+              <a:t>3/26/2025</a:t>
             </a:fld>
             <a:endParaRPr lang="en-US" dirty="0"/>
           </a:p>
@@ -1859,12 +2039,48 @@
           <a:p>
             <a:fld id="{65E34CCE-5110-4F9D-AD9C-A0100FD925AA}" type="slidenum">
               <a:rPr lang="en-US" smtClean="0"/>
-              <a:t>‹#›</a:t>
+              <a:t>‹Nº›</a:t>
             </a:fld>
             <a:endParaRPr lang="en-US" dirty="0"/>
           </a:p>
         </p:txBody>
       </p:sp>
+      <p:pic>
+        <p:nvPicPr>
+          <p:cNvPr id="8" name="Graphic 4">
+            <a:extLst>
+              <a:ext uri="{FF2B5EF4-FFF2-40B4-BE49-F238E27FC236}">
+                <a16:creationId xmlns:a16="http://schemas.microsoft.com/office/drawing/2014/main" id="{7CF81C75-FAB3-0376-DF41-2AF1856EA7FF}"/>
+              </a:ext>
+            </a:extLst>
+          </p:cNvPr>
+          <p:cNvPicPr>
+            <a:picLocks noChangeAspect="1"/>
+          </p:cNvPicPr>
+          <p:nvPr userDrawn="1"/>
+        </p:nvPicPr>
+        <p:blipFill>
+          <a:blip r:embed="rId2">
+            <a:extLst>
+              <a:ext uri="{96DAC541-7B7A-43D3-8B79-37D633B846F1}">
+                <asvg:svgBlip xmlns:asvg="http://schemas.microsoft.com/office/drawing/2016/SVG/main" r:embed="rId3"/>
+              </a:ext>
+            </a:extLst>
+          </a:blip>
+          <a:stretch>
+            <a:fillRect/>
+          </a:stretch>
+        </p:blipFill>
+        <p:spPr>
+          <a:xfrm>
+            <a:off x="5458357" y="5458357"/>
+            <a:ext cx="1399643" cy="1399643"/>
+          </a:xfrm>
+          <a:prstGeom prst="rect">
+            <a:avLst/>
+          </a:prstGeom>
+        </p:spPr>
+      </p:pic>
     </p:spTree>
     <p:extLst>
       <p:ext uri="{BB962C8B-B14F-4D97-AF65-F5344CB8AC3E}">
@@ -2184,7 +2400,7 @@
           <a:p>
             <a:fld id="{410ABB59-F073-482D-9EE1-15AF66EC754A}" type="datetime1">
               <a:rPr lang="en-US" smtClean="0"/>
-              <a:t>10/26/2024</a:t>
+              <a:t>3/26/2025</a:t>
             </a:fld>
             <a:endParaRPr lang="en-US" dirty="0"/>
           </a:p>
@@ -2229,12 +2445,48 @@
           <a:p>
             <a:fld id="{65E34CCE-5110-4F9D-AD9C-A0100FD925AA}" type="slidenum">
               <a:rPr lang="en-US" smtClean="0"/>
-              <a:t>‹#›</a:t>
+              <a:t>‹Nº›</a:t>
             </a:fld>
             <a:endParaRPr lang="en-US" dirty="0"/>
           </a:p>
         </p:txBody>
       </p:sp>
+      <p:pic>
+        <p:nvPicPr>
+          <p:cNvPr id="10" name="Graphic 4">
+            <a:extLst>
+              <a:ext uri="{FF2B5EF4-FFF2-40B4-BE49-F238E27FC236}">
+                <a16:creationId xmlns:a16="http://schemas.microsoft.com/office/drawing/2014/main" id="{D3CE2DFA-5149-CEDA-9EB1-DAB5AC35D190}"/>
+              </a:ext>
+            </a:extLst>
+          </p:cNvPr>
+          <p:cNvPicPr>
+            <a:picLocks noChangeAspect="1"/>
+          </p:cNvPicPr>
+          <p:nvPr userDrawn="1"/>
+        </p:nvPicPr>
+        <p:blipFill>
+          <a:blip r:embed="rId2">
+            <a:extLst>
+              <a:ext uri="{96DAC541-7B7A-43D3-8B79-37D633B846F1}">
+                <asvg:svgBlip xmlns:asvg="http://schemas.microsoft.com/office/drawing/2016/SVG/main" r:embed="rId3"/>
+              </a:ext>
+            </a:extLst>
+          </a:blip>
+          <a:stretch>
+            <a:fillRect/>
+          </a:stretch>
+        </p:blipFill>
+        <p:spPr>
+          <a:xfrm>
+            <a:off x="5458357" y="5458357"/>
+            <a:ext cx="1399643" cy="1399643"/>
+          </a:xfrm>
+          <a:prstGeom prst="rect">
+            <a:avLst/>
+          </a:prstGeom>
+        </p:spPr>
+      </p:pic>
     </p:spTree>
     <p:extLst>
       <p:ext uri="{BB962C8B-B14F-4D97-AF65-F5344CB8AC3E}">
@@ -2305,7 +2557,7 @@
           <a:p>
             <a:fld id="{103FBBD5-6883-47DD-B505-087FA44620D1}" type="datetime1">
               <a:rPr lang="en-US" smtClean="0"/>
-              <a:t>10/26/2024</a:t>
+              <a:t>3/26/2025</a:t>
             </a:fld>
             <a:endParaRPr lang="en-US" dirty="0"/>
           </a:p>
@@ -2350,12 +2602,48 @@
           <a:p>
             <a:fld id="{65E34CCE-5110-4F9D-AD9C-A0100FD925AA}" type="slidenum">
               <a:rPr lang="en-US" smtClean="0"/>
-              <a:t>‹#›</a:t>
+              <a:t>‹Nº›</a:t>
             </a:fld>
             <a:endParaRPr lang="en-US" dirty="0"/>
           </a:p>
         </p:txBody>
       </p:sp>
+      <p:pic>
+        <p:nvPicPr>
+          <p:cNvPr id="6" name="Graphic 4">
+            <a:extLst>
+              <a:ext uri="{FF2B5EF4-FFF2-40B4-BE49-F238E27FC236}">
+                <a16:creationId xmlns:a16="http://schemas.microsoft.com/office/drawing/2014/main" id="{32798E82-FC52-37FF-AC03-3245F4F4B9C0}"/>
+              </a:ext>
+            </a:extLst>
+          </p:cNvPr>
+          <p:cNvPicPr>
+            <a:picLocks noChangeAspect="1"/>
+          </p:cNvPicPr>
+          <p:nvPr userDrawn="1"/>
+        </p:nvPicPr>
+        <p:blipFill>
+          <a:blip r:embed="rId2">
+            <a:extLst>
+              <a:ext uri="{96DAC541-7B7A-43D3-8B79-37D633B846F1}">
+                <asvg:svgBlip xmlns:asvg="http://schemas.microsoft.com/office/drawing/2016/SVG/main" r:embed="rId3"/>
+              </a:ext>
+            </a:extLst>
+          </a:blip>
+          <a:stretch>
+            <a:fillRect/>
+          </a:stretch>
+        </p:blipFill>
+        <p:spPr>
+          <a:xfrm>
+            <a:off x="5458357" y="5458357"/>
+            <a:ext cx="1399643" cy="1399643"/>
+          </a:xfrm>
+          <a:prstGeom prst="rect">
+            <a:avLst/>
+          </a:prstGeom>
+        </p:spPr>
+      </p:pic>
     </p:spTree>
     <p:extLst>
       <p:ext uri="{BB962C8B-B14F-4D97-AF65-F5344CB8AC3E}">
@@ -2403,7 +2691,7 @@
           <a:p>
             <a:fld id="{C3CB7A14-7C91-4820-A14B-BF8AD0082444}" type="datetime1">
               <a:rPr lang="en-US" smtClean="0"/>
-              <a:t>10/26/2024</a:t>
+              <a:t>3/26/2025</a:t>
             </a:fld>
             <a:endParaRPr lang="en-US" dirty="0"/>
           </a:p>
@@ -2448,12 +2736,48 @@
           <a:p>
             <a:fld id="{65E34CCE-5110-4F9D-AD9C-A0100FD925AA}" type="slidenum">
               <a:rPr lang="en-US" smtClean="0"/>
-              <a:t>‹#›</a:t>
+              <a:t>‹Nº›</a:t>
             </a:fld>
             <a:endParaRPr lang="en-US" dirty="0"/>
           </a:p>
         </p:txBody>
       </p:sp>
+      <p:pic>
+        <p:nvPicPr>
+          <p:cNvPr id="5" name="Graphic 4">
+            <a:extLst>
+              <a:ext uri="{FF2B5EF4-FFF2-40B4-BE49-F238E27FC236}">
+                <a16:creationId xmlns:a16="http://schemas.microsoft.com/office/drawing/2014/main" id="{B8C92046-AC78-1F2B-D921-A76C7EA0BCA6}"/>
+              </a:ext>
+            </a:extLst>
+          </p:cNvPr>
+          <p:cNvPicPr>
+            <a:picLocks noChangeAspect="1"/>
+          </p:cNvPicPr>
+          <p:nvPr userDrawn="1"/>
+        </p:nvPicPr>
+        <p:blipFill>
+          <a:blip r:embed="rId2">
+            <a:extLst>
+              <a:ext uri="{96DAC541-7B7A-43D3-8B79-37D633B846F1}">
+                <asvg:svgBlip xmlns:asvg="http://schemas.microsoft.com/office/drawing/2016/SVG/main" r:embed="rId3"/>
+              </a:ext>
+            </a:extLst>
+          </a:blip>
+          <a:stretch>
+            <a:fillRect/>
+          </a:stretch>
+        </p:blipFill>
+        <p:spPr>
+          <a:xfrm>
+            <a:off x="5458357" y="5458357"/>
+            <a:ext cx="1399643" cy="1399643"/>
+          </a:xfrm>
+          <a:prstGeom prst="rect">
+            <a:avLst/>
+          </a:prstGeom>
+        </p:spPr>
+      </p:pic>
     </p:spTree>
     <p:extLst>
       <p:ext uri="{BB962C8B-B14F-4D97-AF65-F5344CB8AC3E}">
@@ -2683,7 +3007,7 @@
           <a:p>
             <a:fld id="{99CAEFC7-E0E7-4071-8195-9F7E4EC624E4}" type="datetime1">
               <a:rPr lang="en-US" smtClean="0"/>
-              <a:t>10/26/2024</a:t>
+              <a:t>3/26/2025</a:t>
             </a:fld>
             <a:endParaRPr lang="en-US" dirty="0"/>
           </a:p>
@@ -2728,12 +3052,48 @@
           <a:p>
             <a:fld id="{65E34CCE-5110-4F9D-AD9C-A0100FD925AA}" type="slidenum">
               <a:rPr lang="en-US" smtClean="0"/>
-              <a:t>‹#›</a:t>
+              <a:t>‹Nº›</a:t>
             </a:fld>
             <a:endParaRPr lang="en-US" dirty="0"/>
           </a:p>
         </p:txBody>
       </p:sp>
+      <p:pic>
+        <p:nvPicPr>
+          <p:cNvPr id="8" name="Graphic 4">
+            <a:extLst>
+              <a:ext uri="{FF2B5EF4-FFF2-40B4-BE49-F238E27FC236}">
+                <a16:creationId xmlns:a16="http://schemas.microsoft.com/office/drawing/2014/main" id="{1B9DF382-E6C7-88C9-E32D-BD134F801EEC}"/>
+              </a:ext>
+            </a:extLst>
+          </p:cNvPr>
+          <p:cNvPicPr>
+            <a:picLocks noChangeAspect="1"/>
+          </p:cNvPicPr>
+          <p:nvPr userDrawn="1"/>
+        </p:nvPicPr>
+        <p:blipFill>
+          <a:blip r:embed="rId2">
+            <a:extLst>
+              <a:ext uri="{96DAC541-7B7A-43D3-8B79-37D633B846F1}">
+                <asvg:svgBlip xmlns:asvg="http://schemas.microsoft.com/office/drawing/2016/SVG/main" r:embed="rId3"/>
+              </a:ext>
+            </a:extLst>
+          </a:blip>
+          <a:stretch>
+            <a:fillRect/>
+          </a:stretch>
+        </p:blipFill>
+        <p:spPr>
+          <a:xfrm>
+            <a:off x="5458357" y="5458357"/>
+            <a:ext cx="1399643" cy="1399643"/>
+          </a:xfrm>
+          <a:prstGeom prst="rect">
+            <a:avLst/>
+          </a:prstGeom>
+        </p:spPr>
+      </p:pic>
     </p:spTree>
     <p:extLst>
       <p:ext uri="{BB962C8B-B14F-4D97-AF65-F5344CB8AC3E}">
@@ -2943,7 +3303,7 @@
           <a:p>
             <a:fld id="{995334F2-A968-4610-AD35-72658AC2976B}" type="datetime1">
               <a:rPr lang="en-US" smtClean="0"/>
-              <a:t>10/26/2024</a:t>
+              <a:t>3/26/2025</a:t>
             </a:fld>
             <a:endParaRPr lang="en-US" dirty="0"/>
           </a:p>
@@ -2988,12 +3348,48 @@
           <a:p>
             <a:fld id="{65E34CCE-5110-4F9D-AD9C-A0100FD925AA}" type="slidenum">
               <a:rPr lang="en-US" smtClean="0"/>
-              <a:t>‹#›</a:t>
+              <a:t>‹Nº›</a:t>
             </a:fld>
             <a:endParaRPr lang="en-US" dirty="0"/>
           </a:p>
         </p:txBody>
       </p:sp>
+      <p:pic>
+        <p:nvPicPr>
+          <p:cNvPr id="8" name="Graphic 4">
+            <a:extLst>
+              <a:ext uri="{FF2B5EF4-FFF2-40B4-BE49-F238E27FC236}">
+                <a16:creationId xmlns:a16="http://schemas.microsoft.com/office/drawing/2014/main" id="{2B82BED4-CBB8-ACF4-CBD3-903AAD71406A}"/>
+              </a:ext>
+            </a:extLst>
+          </p:cNvPr>
+          <p:cNvPicPr>
+            <a:picLocks noChangeAspect="1"/>
+          </p:cNvPicPr>
+          <p:nvPr userDrawn="1"/>
+        </p:nvPicPr>
+        <p:blipFill>
+          <a:blip r:embed="rId2">
+            <a:extLst>
+              <a:ext uri="{96DAC541-7B7A-43D3-8B79-37D633B846F1}">
+                <asvg:svgBlip xmlns:asvg="http://schemas.microsoft.com/office/drawing/2016/SVG/main" r:embed="rId3"/>
+              </a:ext>
+            </a:extLst>
+          </a:blip>
+          <a:stretch>
+            <a:fillRect/>
+          </a:stretch>
+        </p:blipFill>
+        <p:spPr>
+          <a:xfrm>
+            <a:off x="5458357" y="5458357"/>
+            <a:ext cx="1399643" cy="1399643"/>
+          </a:xfrm>
+          <a:prstGeom prst="rect">
+            <a:avLst/>
+          </a:prstGeom>
+        </p:spPr>
+      </p:pic>
     </p:spTree>
     <p:extLst>
       <p:ext uri="{BB962C8B-B14F-4D97-AF65-F5344CB8AC3E}">
@@ -3162,7 +3558,7 @@
           <a:p>
             <a:fld id="{99900706-C347-4380-A4CB-495CC5D0EC7D}" type="datetime1">
               <a:rPr lang="en-US" smtClean="0"/>
-              <a:t>10/26/2024</a:t>
+              <a:t>3/26/2025</a:t>
             </a:fld>
             <a:endParaRPr lang="en-US" dirty="0"/>
           </a:p>
@@ -3243,12 +3639,48 @@
           <a:p>
             <a:fld id="{65E34CCE-5110-4F9D-AD9C-A0100FD925AA}" type="slidenum">
               <a:rPr lang="en-US" smtClean="0"/>
-              <a:t>‹#›</a:t>
+              <a:t>‹Nº›</a:t>
             </a:fld>
             <a:endParaRPr lang="en-US" dirty="0"/>
           </a:p>
         </p:txBody>
       </p:sp>
+      <p:pic>
+        <p:nvPicPr>
+          <p:cNvPr id="7" name="Graphic 4">
+            <a:extLst>
+              <a:ext uri="{FF2B5EF4-FFF2-40B4-BE49-F238E27FC236}">
+                <a16:creationId xmlns:a16="http://schemas.microsoft.com/office/drawing/2014/main" id="{74CACDF8-116E-DF78-178F-E7A1C942C9F5}"/>
+              </a:ext>
+            </a:extLst>
+          </p:cNvPr>
+          <p:cNvPicPr>
+            <a:picLocks noChangeAspect="1"/>
+          </p:cNvPicPr>
+          <p:nvPr userDrawn="1"/>
+        </p:nvPicPr>
+        <p:blipFill>
+          <a:blip r:embed="rId13">
+            <a:extLst>
+              <a:ext uri="{96DAC541-7B7A-43D3-8B79-37D633B846F1}">
+                <asvg:svgBlip xmlns:asvg="http://schemas.microsoft.com/office/drawing/2016/SVG/main" r:embed="rId14"/>
+              </a:ext>
+            </a:extLst>
+          </a:blip>
+          <a:stretch>
+            <a:fillRect/>
+          </a:stretch>
+        </p:blipFill>
+        <p:spPr>
+          <a:xfrm>
+            <a:off x="5458357" y="5458357"/>
+            <a:ext cx="1399643" cy="1399643"/>
+          </a:xfrm>
+          <a:prstGeom prst="rect">
+            <a:avLst/>
+          </a:prstGeom>
+        </p:spPr>
+      </p:pic>
     </p:spTree>
     <p:extLst>
       <p:ext uri="{BB962C8B-B14F-4D97-AF65-F5344CB8AC3E}">
@@ -4018,6 +4450,67 @@
           </a:prstGeom>
         </p:spPr>
       </p:pic>
+      <p:sp>
+        <p:nvSpPr>
+          <p:cNvPr id="4" name="Rectángulo 3">
+            <a:extLst>
+              <a:ext uri="{FF2B5EF4-FFF2-40B4-BE49-F238E27FC236}">
+                <a16:creationId xmlns:a16="http://schemas.microsoft.com/office/drawing/2014/main" id="{8CA67CB3-27AB-03E6-3CAE-D3C4FACADC35}"/>
+              </a:ext>
+            </a:extLst>
+          </p:cNvPr>
+          <p:cNvSpPr/>
+          <p:nvPr/>
+        </p:nvSpPr>
+        <p:spPr>
+          <a:xfrm>
+            <a:off x="2662237" y="6176963"/>
+            <a:ext cx="1533525" cy="681038"/>
+          </a:xfrm>
+          <a:prstGeom prst="rect">
+            <a:avLst/>
+          </a:prstGeom>
+          <a:noFill/>
+          <a:ln>
+            <a:noFill/>
+          </a:ln>
+        </p:spPr>
+        <p:style>
+          <a:lnRef idx="2">
+            <a:schemeClr val="accent1">
+              <a:shade val="50000"/>
+            </a:schemeClr>
+          </a:lnRef>
+          <a:fillRef idx="1">
+            <a:schemeClr val="accent1"/>
+          </a:fillRef>
+          <a:effectRef idx="0">
+            <a:schemeClr val="accent1"/>
+          </a:effectRef>
+          <a:fontRef idx="minor">
+            <a:schemeClr val="lt1"/>
+          </a:fontRef>
+        </p:style>
+        <p:txBody>
+          <a:bodyPr rtlCol="0" anchor="ctr"/>
+          <a:lstStyle/>
+          <a:p>
+            <a:pPr algn="ctr"/>
+            <a:r>
+              <a:rPr lang="es-CO" sz="900" i="1" dirty="0">
+                <a:solidFill>
+                  <a:schemeClr val="bg1">
+                    <a:lumMod val="75000"/>
+                  </a:schemeClr>
+                </a:solidFill>
+                <a:latin typeface="Poppins" panose="00000500000000000000" pitchFamily="2" charset="0"/>
+                <a:cs typeface="Poppins" panose="00000500000000000000" pitchFamily="2" charset="0"/>
+              </a:rPr>
+              <a:t>Departamento IT</a:t>
+            </a:r>
+          </a:p>
+        </p:txBody>
+      </p:sp>
     </p:spTree>
     <p:extLst>
       <p:ext uri="{BB962C8B-B14F-4D97-AF65-F5344CB8AC3E}">
@@ -4200,6 +4693,67 @@
           </a:prstGeom>
         </p:spPr>
       </p:pic>
+      <p:sp>
+        <p:nvSpPr>
+          <p:cNvPr id="4" name="Rectángulo 3">
+            <a:extLst>
+              <a:ext uri="{FF2B5EF4-FFF2-40B4-BE49-F238E27FC236}">
+                <a16:creationId xmlns:a16="http://schemas.microsoft.com/office/drawing/2014/main" id="{DD452E71-E898-2192-4FA6-2F0EADAD0FB7}"/>
+              </a:ext>
+            </a:extLst>
+          </p:cNvPr>
+          <p:cNvSpPr/>
+          <p:nvPr/>
+        </p:nvSpPr>
+        <p:spPr>
+          <a:xfrm>
+            <a:off x="2662237" y="6176963"/>
+            <a:ext cx="1533525" cy="681038"/>
+          </a:xfrm>
+          <a:prstGeom prst="rect">
+            <a:avLst/>
+          </a:prstGeom>
+          <a:noFill/>
+          <a:ln>
+            <a:noFill/>
+          </a:ln>
+        </p:spPr>
+        <p:style>
+          <a:lnRef idx="2">
+            <a:schemeClr val="accent1">
+              <a:shade val="50000"/>
+            </a:schemeClr>
+          </a:lnRef>
+          <a:fillRef idx="1">
+            <a:schemeClr val="accent1"/>
+          </a:fillRef>
+          <a:effectRef idx="0">
+            <a:schemeClr val="accent1"/>
+          </a:effectRef>
+          <a:fontRef idx="minor">
+            <a:schemeClr val="lt1"/>
+          </a:fontRef>
+        </p:style>
+        <p:txBody>
+          <a:bodyPr rtlCol="0" anchor="ctr"/>
+          <a:lstStyle/>
+          <a:p>
+            <a:pPr algn="ctr"/>
+            <a:r>
+              <a:rPr lang="es-CO" sz="900" i="1" dirty="0">
+                <a:solidFill>
+                  <a:schemeClr val="bg1">
+                    <a:lumMod val="75000"/>
+                  </a:schemeClr>
+                </a:solidFill>
+                <a:latin typeface="Poppins" panose="00000500000000000000" pitchFamily="2" charset="0"/>
+                <a:cs typeface="Poppins" panose="00000500000000000000" pitchFamily="2" charset="0"/>
+              </a:rPr>
+              <a:t>Departamento IT</a:t>
+            </a:r>
+          </a:p>
+        </p:txBody>
+      </p:sp>
     </p:spTree>
     <p:extLst>
       <p:ext uri="{BB962C8B-B14F-4D97-AF65-F5344CB8AC3E}">
@@ -4382,6 +4936,67 @@
           </a:prstGeom>
         </p:spPr>
       </p:pic>
+      <p:sp>
+        <p:nvSpPr>
+          <p:cNvPr id="8" name="Rectángulo 7">
+            <a:extLst>
+              <a:ext uri="{FF2B5EF4-FFF2-40B4-BE49-F238E27FC236}">
+                <a16:creationId xmlns:a16="http://schemas.microsoft.com/office/drawing/2014/main" id="{95AA9B01-1EDD-5414-6C89-DB415A5EB7B8}"/>
+              </a:ext>
+            </a:extLst>
+          </p:cNvPr>
+          <p:cNvSpPr/>
+          <p:nvPr/>
+        </p:nvSpPr>
+        <p:spPr>
+          <a:xfrm>
+            <a:off x="2662237" y="6176963"/>
+            <a:ext cx="1533525" cy="681038"/>
+          </a:xfrm>
+          <a:prstGeom prst="rect">
+            <a:avLst/>
+          </a:prstGeom>
+          <a:noFill/>
+          <a:ln>
+            <a:noFill/>
+          </a:ln>
+        </p:spPr>
+        <p:style>
+          <a:lnRef idx="2">
+            <a:schemeClr val="accent1">
+              <a:shade val="50000"/>
+            </a:schemeClr>
+          </a:lnRef>
+          <a:fillRef idx="1">
+            <a:schemeClr val="accent1"/>
+          </a:fillRef>
+          <a:effectRef idx="0">
+            <a:schemeClr val="accent1"/>
+          </a:effectRef>
+          <a:fontRef idx="minor">
+            <a:schemeClr val="lt1"/>
+          </a:fontRef>
+        </p:style>
+        <p:txBody>
+          <a:bodyPr rtlCol="0" anchor="ctr"/>
+          <a:lstStyle/>
+          <a:p>
+            <a:pPr algn="ctr"/>
+            <a:r>
+              <a:rPr lang="es-CO" sz="900" i="1" dirty="0">
+                <a:solidFill>
+                  <a:schemeClr val="bg1">
+                    <a:lumMod val="75000"/>
+                  </a:schemeClr>
+                </a:solidFill>
+                <a:latin typeface="Poppins" panose="00000500000000000000" pitchFamily="2" charset="0"/>
+                <a:cs typeface="Poppins" panose="00000500000000000000" pitchFamily="2" charset="0"/>
+              </a:rPr>
+              <a:t>Departamento IT</a:t>
+            </a:r>
+          </a:p>
+        </p:txBody>
+      </p:sp>
     </p:spTree>
     <p:extLst>
       <p:ext uri="{BB962C8B-B14F-4D97-AF65-F5344CB8AC3E}">
@@ -4543,6 +5158,67 @@
           </a:prstGeom>
         </p:spPr>
       </p:pic>
+      <p:sp>
+        <p:nvSpPr>
+          <p:cNvPr id="7" name="Rectángulo 6">
+            <a:extLst>
+              <a:ext uri="{FF2B5EF4-FFF2-40B4-BE49-F238E27FC236}">
+                <a16:creationId xmlns:a16="http://schemas.microsoft.com/office/drawing/2014/main" id="{F354C95D-C4F4-A707-6C6F-D9912A4E389F}"/>
+              </a:ext>
+            </a:extLst>
+          </p:cNvPr>
+          <p:cNvSpPr/>
+          <p:nvPr/>
+        </p:nvSpPr>
+        <p:spPr>
+          <a:xfrm>
+            <a:off x="2662237" y="6176963"/>
+            <a:ext cx="1533525" cy="681038"/>
+          </a:xfrm>
+          <a:prstGeom prst="rect">
+            <a:avLst/>
+          </a:prstGeom>
+          <a:noFill/>
+          <a:ln>
+            <a:noFill/>
+          </a:ln>
+        </p:spPr>
+        <p:style>
+          <a:lnRef idx="2">
+            <a:schemeClr val="accent1">
+              <a:shade val="50000"/>
+            </a:schemeClr>
+          </a:lnRef>
+          <a:fillRef idx="1">
+            <a:schemeClr val="accent1"/>
+          </a:fillRef>
+          <a:effectRef idx="0">
+            <a:schemeClr val="accent1"/>
+          </a:effectRef>
+          <a:fontRef idx="minor">
+            <a:schemeClr val="lt1"/>
+          </a:fontRef>
+        </p:style>
+        <p:txBody>
+          <a:bodyPr rtlCol="0" anchor="ctr"/>
+          <a:lstStyle/>
+          <a:p>
+            <a:pPr algn="ctr"/>
+            <a:r>
+              <a:rPr lang="es-CO" sz="900" i="1" dirty="0">
+                <a:solidFill>
+                  <a:schemeClr val="bg1">
+                    <a:lumMod val="75000"/>
+                  </a:schemeClr>
+                </a:solidFill>
+                <a:latin typeface="Poppins" panose="00000500000000000000" pitchFamily="2" charset="0"/>
+                <a:cs typeface="Poppins" panose="00000500000000000000" pitchFamily="2" charset="0"/>
+              </a:rPr>
+              <a:t>Departamento IT</a:t>
+            </a:r>
+          </a:p>
+        </p:txBody>
+      </p:sp>
     </p:spTree>
     <p:extLst>
       <p:ext uri="{BB962C8B-B14F-4D97-AF65-F5344CB8AC3E}">
@@ -4699,6 +5375,67 @@
           </a:prstGeom>
         </p:spPr>
       </p:pic>
+      <p:sp>
+        <p:nvSpPr>
+          <p:cNvPr id="4" name="Rectángulo 3">
+            <a:extLst>
+              <a:ext uri="{FF2B5EF4-FFF2-40B4-BE49-F238E27FC236}">
+                <a16:creationId xmlns:a16="http://schemas.microsoft.com/office/drawing/2014/main" id="{DB3D1769-9CEA-51A3-0A87-3734C865923E}"/>
+              </a:ext>
+            </a:extLst>
+          </p:cNvPr>
+          <p:cNvSpPr/>
+          <p:nvPr/>
+        </p:nvSpPr>
+        <p:spPr>
+          <a:xfrm>
+            <a:off x="2662237" y="6176963"/>
+            <a:ext cx="1533525" cy="681038"/>
+          </a:xfrm>
+          <a:prstGeom prst="rect">
+            <a:avLst/>
+          </a:prstGeom>
+          <a:noFill/>
+          <a:ln>
+            <a:noFill/>
+          </a:ln>
+        </p:spPr>
+        <p:style>
+          <a:lnRef idx="2">
+            <a:schemeClr val="accent1">
+              <a:shade val="50000"/>
+            </a:schemeClr>
+          </a:lnRef>
+          <a:fillRef idx="1">
+            <a:schemeClr val="accent1"/>
+          </a:fillRef>
+          <a:effectRef idx="0">
+            <a:schemeClr val="accent1"/>
+          </a:effectRef>
+          <a:fontRef idx="minor">
+            <a:schemeClr val="lt1"/>
+          </a:fontRef>
+        </p:style>
+        <p:txBody>
+          <a:bodyPr rtlCol="0" anchor="ctr"/>
+          <a:lstStyle/>
+          <a:p>
+            <a:pPr algn="ctr"/>
+            <a:r>
+              <a:rPr lang="es-CO" sz="900" i="1" dirty="0">
+                <a:solidFill>
+                  <a:schemeClr val="bg1">
+                    <a:lumMod val="75000"/>
+                  </a:schemeClr>
+                </a:solidFill>
+                <a:latin typeface="Poppins" panose="00000500000000000000" pitchFamily="2" charset="0"/>
+                <a:cs typeface="Poppins" panose="00000500000000000000" pitchFamily="2" charset="0"/>
+              </a:rPr>
+              <a:t>Departamento IT</a:t>
+            </a:r>
+          </a:p>
+        </p:txBody>
+      </p:sp>
     </p:spTree>
     <p:extLst>
       <p:ext uri="{BB962C8B-B14F-4D97-AF65-F5344CB8AC3E}">
@@ -5000,6 +5737,67 @@
           </a:prstGeom>
         </p:spPr>
       </p:pic>
+      <p:sp>
+        <p:nvSpPr>
+          <p:cNvPr id="4" name="Rectángulo 3">
+            <a:extLst>
+              <a:ext uri="{FF2B5EF4-FFF2-40B4-BE49-F238E27FC236}">
+                <a16:creationId xmlns:a16="http://schemas.microsoft.com/office/drawing/2014/main" id="{7C8AD622-A661-CB1F-E0AB-AE0F2A94A104}"/>
+              </a:ext>
+            </a:extLst>
+          </p:cNvPr>
+          <p:cNvSpPr/>
+          <p:nvPr/>
+        </p:nvSpPr>
+        <p:spPr>
+          <a:xfrm>
+            <a:off x="2662237" y="6176963"/>
+            <a:ext cx="1533525" cy="681038"/>
+          </a:xfrm>
+          <a:prstGeom prst="rect">
+            <a:avLst/>
+          </a:prstGeom>
+          <a:noFill/>
+          <a:ln>
+            <a:noFill/>
+          </a:ln>
+        </p:spPr>
+        <p:style>
+          <a:lnRef idx="2">
+            <a:schemeClr val="accent1">
+              <a:shade val="50000"/>
+            </a:schemeClr>
+          </a:lnRef>
+          <a:fillRef idx="1">
+            <a:schemeClr val="accent1"/>
+          </a:fillRef>
+          <a:effectRef idx="0">
+            <a:schemeClr val="accent1"/>
+          </a:effectRef>
+          <a:fontRef idx="minor">
+            <a:schemeClr val="lt1"/>
+          </a:fontRef>
+        </p:style>
+        <p:txBody>
+          <a:bodyPr rtlCol="0" anchor="ctr"/>
+          <a:lstStyle/>
+          <a:p>
+            <a:pPr algn="ctr"/>
+            <a:r>
+              <a:rPr lang="es-CO" sz="900" i="1" dirty="0">
+                <a:solidFill>
+                  <a:schemeClr val="bg1">
+                    <a:lumMod val="75000"/>
+                  </a:schemeClr>
+                </a:solidFill>
+                <a:latin typeface="Poppins" panose="00000500000000000000" pitchFamily="2" charset="0"/>
+                <a:cs typeface="Poppins" panose="00000500000000000000" pitchFamily="2" charset="0"/>
+              </a:rPr>
+              <a:t>Departamento IT</a:t>
+            </a:r>
+          </a:p>
+        </p:txBody>
+      </p:sp>
     </p:spTree>
     <p:extLst>
       <p:ext uri="{BB962C8B-B14F-4D97-AF65-F5344CB8AC3E}">
@@ -5232,6 +6030,67 @@
           </a:prstGeom>
         </p:spPr>
       </p:pic>
+      <p:sp>
+        <p:nvSpPr>
+          <p:cNvPr id="4" name="Rectángulo 3">
+            <a:extLst>
+              <a:ext uri="{FF2B5EF4-FFF2-40B4-BE49-F238E27FC236}">
+                <a16:creationId xmlns:a16="http://schemas.microsoft.com/office/drawing/2014/main" id="{ECB8D59C-F197-4C40-D32B-D87801BB9344}"/>
+              </a:ext>
+            </a:extLst>
+          </p:cNvPr>
+          <p:cNvSpPr/>
+          <p:nvPr/>
+        </p:nvSpPr>
+        <p:spPr>
+          <a:xfrm>
+            <a:off x="2662237" y="6176963"/>
+            <a:ext cx="1533525" cy="681038"/>
+          </a:xfrm>
+          <a:prstGeom prst="rect">
+            <a:avLst/>
+          </a:prstGeom>
+          <a:noFill/>
+          <a:ln>
+            <a:noFill/>
+          </a:ln>
+        </p:spPr>
+        <p:style>
+          <a:lnRef idx="2">
+            <a:schemeClr val="accent1">
+              <a:shade val="50000"/>
+            </a:schemeClr>
+          </a:lnRef>
+          <a:fillRef idx="1">
+            <a:schemeClr val="accent1"/>
+          </a:fillRef>
+          <a:effectRef idx="0">
+            <a:schemeClr val="accent1"/>
+          </a:effectRef>
+          <a:fontRef idx="minor">
+            <a:schemeClr val="lt1"/>
+          </a:fontRef>
+        </p:style>
+        <p:txBody>
+          <a:bodyPr rtlCol="0" anchor="ctr"/>
+          <a:lstStyle/>
+          <a:p>
+            <a:pPr algn="ctr"/>
+            <a:r>
+              <a:rPr lang="es-CO" sz="900" i="1" dirty="0">
+                <a:solidFill>
+                  <a:schemeClr val="bg1">
+                    <a:lumMod val="75000"/>
+                  </a:schemeClr>
+                </a:solidFill>
+                <a:latin typeface="Poppins" panose="00000500000000000000" pitchFamily="2" charset="0"/>
+                <a:cs typeface="Poppins" panose="00000500000000000000" pitchFamily="2" charset="0"/>
+              </a:rPr>
+              <a:t>Departamento IT</a:t>
+            </a:r>
+          </a:p>
+        </p:txBody>
+      </p:sp>
     </p:spTree>
     <p:extLst>
       <p:ext uri="{BB962C8B-B14F-4D97-AF65-F5344CB8AC3E}">
@@ -5414,6 +6273,67 @@
           </a:prstGeom>
         </p:spPr>
       </p:pic>
+      <p:sp>
+        <p:nvSpPr>
+          <p:cNvPr id="4" name="Rectángulo 3">
+            <a:extLst>
+              <a:ext uri="{FF2B5EF4-FFF2-40B4-BE49-F238E27FC236}">
+                <a16:creationId xmlns:a16="http://schemas.microsoft.com/office/drawing/2014/main" id="{F76CF47A-1469-5240-AAA5-C417405985EA}"/>
+              </a:ext>
+            </a:extLst>
+          </p:cNvPr>
+          <p:cNvSpPr/>
+          <p:nvPr/>
+        </p:nvSpPr>
+        <p:spPr>
+          <a:xfrm>
+            <a:off x="2662237" y="6176963"/>
+            <a:ext cx="1533525" cy="681038"/>
+          </a:xfrm>
+          <a:prstGeom prst="rect">
+            <a:avLst/>
+          </a:prstGeom>
+          <a:noFill/>
+          <a:ln>
+            <a:noFill/>
+          </a:ln>
+        </p:spPr>
+        <p:style>
+          <a:lnRef idx="2">
+            <a:schemeClr val="accent1">
+              <a:shade val="50000"/>
+            </a:schemeClr>
+          </a:lnRef>
+          <a:fillRef idx="1">
+            <a:schemeClr val="accent1"/>
+          </a:fillRef>
+          <a:effectRef idx="0">
+            <a:schemeClr val="accent1"/>
+          </a:effectRef>
+          <a:fontRef idx="minor">
+            <a:schemeClr val="lt1"/>
+          </a:fontRef>
+        </p:style>
+        <p:txBody>
+          <a:bodyPr rtlCol="0" anchor="ctr"/>
+          <a:lstStyle/>
+          <a:p>
+            <a:pPr algn="ctr"/>
+            <a:r>
+              <a:rPr lang="es-CO" sz="900" i="1" dirty="0">
+                <a:solidFill>
+                  <a:schemeClr val="bg1">
+                    <a:lumMod val="75000"/>
+                  </a:schemeClr>
+                </a:solidFill>
+                <a:latin typeface="Poppins" panose="00000500000000000000" pitchFamily="2" charset="0"/>
+                <a:cs typeface="Poppins" panose="00000500000000000000" pitchFamily="2" charset="0"/>
+              </a:rPr>
+              <a:t>Departamento IT</a:t>
+            </a:r>
+          </a:p>
+        </p:txBody>
+      </p:sp>
     </p:spTree>
     <p:extLst>
       <p:ext uri="{BB962C8B-B14F-4D97-AF65-F5344CB8AC3E}">
@@ -5596,6 +6516,67 @@
           </a:prstGeom>
         </p:spPr>
       </p:pic>
+      <p:sp>
+        <p:nvSpPr>
+          <p:cNvPr id="4" name="Rectángulo 3">
+            <a:extLst>
+              <a:ext uri="{FF2B5EF4-FFF2-40B4-BE49-F238E27FC236}">
+                <a16:creationId xmlns:a16="http://schemas.microsoft.com/office/drawing/2014/main" id="{C6103E89-4A89-9B11-0BCE-4D74EA3CDC78}"/>
+              </a:ext>
+            </a:extLst>
+          </p:cNvPr>
+          <p:cNvSpPr/>
+          <p:nvPr/>
+        </p:nvSpPr>
+        <p:spPr>
+          <a:xfrm>
+            <a:off x="2662237" y="6176963"/>
+            <a:ext cx="1533525" cy="681038"/>
+          </a:xfrm>
+          <a:prstGeom prst="rect">
+            <a:avLst/>
+          </a:prstGeom>
+          <a:noFill/>
+          <a:ln>
+            <a:noFill/>
+          </a:ln>
+        </p:spPr>
+        <p:style>
+          <a:lnRef idx="2">
+            <a:schemeClr val="accent1">
+              <a:shade val="50000"/>
+            </a:schemeClr>
+          </a:lnRef>
+          <a:fillRef idx="1">
+            <a:schemeClr val="accent1"/>
+          </a:fillRef>
+          <a:effectRef idx="0">
+            <a:schemeClr val="accent1"/>
+          </a:effectRef>
+          <a:fontRef idx="minor">
+            <a:schemeClr val="lt1"/>
+          </a:fontRef>
+        </p:style>
+        <p:txBody>
+          <a:bodyPr rtlCol="0" anchor="ctr"/>
+          <a:lstStyle/>
+          <a:p>
+            <a:pPr algn="ctr"/>
+            <a:r>
+              <a:rPr lang="es-CO" sz="900" i="1" dirty="0">
+                <a:solidFill>
+                  <a:schemeClr val="bg1">
+                    <a:lumMod val="75000"/>
+                  </a:schemeClr>
+                </a:solidFill>
+                <a:latin typeface="Poppins" panose="00000500000000000000" pitchFamily="2" charset="0"/>
+                <a:cs typeface="Poppins" panose="00000500000000000000" pitchFamily="2" charset="0"/>
+              </a:rPr>
+              <a:t>Departamento IT</a:t>
+            </a:r>
+          </a:p>
+        </p:txBody>
+      </p:sp>
     </p:spTree>
     <p:extLst>
       <p:ext uri="{BB962C8B-B14F-4D97-AF65-F5344CB8AC3E}">
@@ -5784,6 +6765,67 @@
           </a:prstGeom>
         </p:spPr>
       </p:pic>
+      <p:sp>
+        <p:nvSpPr>
+          <p:cNvPr id="4" name="Rectángulo 3">
+            <a:extLst>
+              <a:ext uri="{FF2B5EF4-FFF2-40B4-BE49-F238E27FC236}">
+                <a16:creationId xmlns:a16="http://schemas.microsoft.com/office/drawing/2014/main" id="{D8DBBB09-6E81-EC7D-36F9-E1103B0B5F5F}"/>
+              </a:ext>
+            </a:extLst>
+          </p:cNvPr>
+          <p:cNvSpPr/>
+          <p:nvPr/>
+        </p:nvSpPr>
+        <p:spPr>
+          <a:xfrm>
+            <a:off x="2662237" y="6176963"/>
+            <a:ext cx="1533525" cy="681038"/>
+          </a:xfrm>
+          <a:prstGeom prst="rect">
+            <a:avLst/>
+          </a:prstGeom>
+          <a:noFill/>
+          <a:ln>
+            <a:noFill/>
+          </a:ln>
+        </p:spPr>
+        <p:style>
+          <a:lnRef idx="2">
+            <a:schemeClr val="accent1">
+              <a:shade val="50000"/>
+            </a:schemeClr>
+          </a:lnRef>
+          <a:fillRef idx="1">
+            <a:schemeClr val="accent1"/>
+          </a:fillRef>
+          <a:effectRef idx="0">
+            <a:schemeClr val="accent1"/>
+          </a:effectRef>
+          <a:fontRef idx="minor">
+            <a:schemeClr val="lt1"/>
+          </a:fontRef>
+        </p:style>
+        <p:txBody>
+          <a:bodyPr rtlCol="0" anchor="ctr"/>
+          <a:lstStyle/>
+          <a:p>
+            <a:pPr algn="ctr"/>
+            <a:r>
+              <a:rPr lang="es-CO" sz="900" i="1" dirty="0">
+                <a:solidFill>
+                  <a:schemeClr val="bg1">
+                    <a:lumMod val="75000"/>
+                  </a:schemeClr>
+                </a:solidFill>
+                <a:latin typeface="Poppins" panose="00000500000000000000" pitchFamily="2" charset="0"/>
+                <a:cs typeface="Poppins" panose="00000500000000000000" pitchFamily="2" charset="0"/>
+              </a:rPr>
+              <a:t>Departamento IT</a:t>
+            </a:r>
+          </a:p>
+        </p:txBody>
+      </p:sp>
     </p:spTree>
     <p:extLst>
       <p:ext uri="{BB962C8B-B14F-4D97-AF65-F5344CB8AC3E}">
@@ -5966,6 +7008,67 @@
           </a:prstGeom>
         </p:spPr>
       </p:pic>
+      <p:sp>
+        <p:nvSpPr>
+          <p:cNvPr id="4" name="Rectángulo 3">
+            <a:extLst>
+              <a:ext uri="{FF2B5EF4-FFF2-40B4-BE49-F238E27FC236}">
+                <a16:creationId xmlns:a16="http://schemas.microsoft.com/office/drawing/2014/main" id="{7436EAC7-D482-2755-EA2F-FE05F0B40971}"/>
+              </a:ext>
+            </a:extLst>
+          </p:cNvPr>
+          <p:cNvSpPr/>
+          <p:nvPr/>
+        </p:nvSpPr>
+        <p:spPr>
+          <a:xfrm>
+            <a:off x="2662237" y="6176963"/>
+            <a:ext cx="1533525" cy="681038"/>
+          </a:xfrm>
+          <a:prstGeom prst="rect">
+            <a:avLst/>
+          </a:prstGeom>
+          <a:noFill/>
+          <a:ln>
+            <a:noFill/>
+          </a:ln>
+        </p:spPr>
+        <p:style>
+          <a:lnRef idx="2">
+            <a:schemeClr val="accent1">
+              <a:shade val="50000"/>
+            </a:schemeClr>
+          </a:lnRef>
+          <a:fillRef idx="1">
+            <a:schemeClr val="accent1"/>
+          </a:fillRef>
+          <a:effectRef idx="0">
+            <a:schemeClr val="accent1"/>
+          </a:effectRef>
+          <a:fontRef idx="minor">
+            <a:schemeClr val="lt1"/>
+          </a:fontRef>
+        </p:style>
+        <p:txBody>
+          <a:bodyPr rtlCol="0" anchor="ctr"/>
+          <a:lstStyle/>
+          <a:p>
+            <a:pPr algn="ctr"/>
+            <a:r>
+              <a:rPr lang="es-CO" sz="900" i="1" dirty="0">
+                <a:solidFill>
+                  <a:schemeClr val="bg1">
+                    <a:lumMod val="75000"/>
+                  </a:schemeClr>
+                </a:solidFill>
+                <a:latin typeface="Poppins" panose="00000500000000000000" pitchFamily="2" charset="0"/>
+                <a:cs typeface="Poppins" panose="00000500000000000000" pitchFamily="2" charset="0"/>
+              </a:rPr>
+              <a:t>Departamento IT</a:t>
+            </a:r>
+          </a:p>
+        </p:txBody>
+      </p:sp>
     </p:spTree>
     <p:extLst>
       <p:ext uri="{BB962C8B-B14F-4D97-AF65-F5344CB8AC3E}">

</xml_diff>